<commit_message>
update: DB Table 수정
</commit_message>
<xml_diff>
--- a/LePl_Server.pptx
+++ b/LePl_Server.pptx
@@ -279,7 +279,7 @@
           <a:p>
             <a:fld id="{54483ECF-B484-47BC-8A21-BE400A6D37B2}" type="datetimeFigureOut">
               <a:rPr lang="ko-KR" altLang="en-US" smtClean="0"/>
-              <a:t>2023-10-10</a:t>
+              <a:t>2023-10-12</a:t>
             </a:fld>
             <a:endParaRPr lang="ko-KR" altLang="en-US"/>
           </a:p>
@@ -477,7 +477,7 @@
           <a:p>
             <a:fld id="{54483ECF-B484-47BC-8A21-BE400A6D37B2}" type="datetimeFigureOut">
               <a:rPr lang="ko-KR" altLang="en-US" smtClean="0"/>
-              <a:t>2023-10-10</a:t>
+              <a:t>2023-10-12</a:t>
             </a:fld>
             <a:endParaRPr lang="ko-KR" altLang="en-US"/>
           </a:p>
@@ -685,7 +685,7 @@
           <a:p>
             <a:fld id="{54483ECF-B484-47BC-8A21-BE400A6D37B2}" type="datetimeFigureOut">
               <a:rPr lang="ko-KR" altLang="en-US" smtClean="0"/>
-              <a:t>2023-10-10</a:t>
+              <a:t>2023-10-12</a:t>
             </a:fld>
             <a:endParaRPr lang="ko-KR" altLang="en-US"/>
           </a:p>
@@ -883,7 +883,7 @@
           <a:p>
             <a:fld id="{54483ECF-B484-47BC-8A21-BE400A6D37B2}" type="datetimeFigureOut">
               <a:rPr lang="ko-KR" altLang="en-US" smtClean="0"/>
-              <a:t>2023-10-10</a:t>
+              <a:t>2023-10-12</a:t>
             </a:fld>
             <a:endParaRPr lang="ko-KR" altLang="en-US"/>
           </a:p>
@@ -1158,7 +1158,7 @@
           <a:p>
             <a:fld id="{54483ECF-B484-47BC-8A21-BE400A6D37B2}" type="datetimeFigureOut">
               <a:rPr lang="ko-KR" altLang="en-US" smtClean="0"/>
-              <a:t>2023-10-10</a:t>
+              <a:t>2023-10-12</a:t>
             </a:fld>
             <a:endParaRPr lang="ko-KR" altLang="en-US"/>
           </a:p>
@@ -1423,7 +1423,7 @@
           <a:p>
             <a:fld id="{54483ECF-B484-47BC-8A21-BE400A6D37B2}" type="datetimeFigureOut">
               <a:rPr lang="ko-KR" altLang="en-US" smtClean="0"/>
-              <a:t>2023-10-10</a:t>
+              <a:t>2023-10-12</a:t>
             </a:fld>
             <a:endParaRPr lang="ko-KR" altLang="en-US"/>
           </a:p>
@@ -1835,7 +1835,7 @@
           <a:p>
             <a:fld id="{54483ECF-B484-47BC-8A21-BE400A6D37B2}" type="datetimeFigureOut">
               <a:rPr lang="ko-KR" altLang="en-US" smtClean="0"/>
-              <a:t>2023-10-10</a:t>
+              <a:t>2023-10-12</a:t>
             </a:fld>
             <a:endParaRPr lang="ko-KR" altLang="en-US"/>
           </a:p>
@@ -1976,7 +1976,7 @@
           <a:p>
             <a:fld id="{54483ECF-B484-47BC-8A21-BE400A6D37B2}" type="datetimeFigureOut">
               <a:rPr lang="ko-KR" altLang="en-US" smtClean="0"/>
-              <a:t>2023-10-10</a:t>
+              <a:t>2023-10-12</a:t>
             </a:fld>
             <a:endParaRPr lang="ko-KR" altLang="en-US"/>
           </a:p>
@@ -2089,7 +2089,7 @@
           <a:p>
             <a:fld id="{54483ECF-B484-47BC-8A21-BE400A6D37B2}" type="datetimeFigureOut">
               <a:rPr lang="ko-KR" altLang="en-US" smtClean="0"/>
-              <a:t>2023-10-10</a:t>
+              <a:t>2023-10-12</a:t>
             </a:fld>
             <a:endParaRPr lang="ko-KR" altLang="en-US"/>
           </a:p>
@@ -2400,7 +2400,7 @@
           <a:p>
             <a:fld id="{54483ECF-B484-47BC-8A21-BE400A6D37B2}" type="datetimeFigureOut">
               <a:rPr lang="ko-KR" altLang="en-US" smtClean="0"/>
-              <a:t>2023-10-10</a:t>
+              <a:t>2023-10-12</a:t>
             </a:fld>
             <a:endParaRPr lang="ko-KR" altLang="en-US"/>
           </a:p>
@@ -2688,7 +2688,7 @@
           <a:p>
             <a:fld id="{54483ECF-B484-47BC-8A21-BE400A6D37B2}" type="datetimeFigureOut">
               <a:rPr lang="ko-KR" altLang="en-US" smtClean="0"/>
-              <a:t>2023-10-10</a:t>
+              <a:t>2023-10-12</a:t>
             </a:fld>
             <a:endParaRPr lang="ko-KR" altLang="en-US"/>
           </a:p>
@@ -2929,7 +2929,7 @@
           <a:p>
             <a:fld id="{54483ECF-B484-47BC-8A21-BE400A6D37B2}" type="datetimeFigureOut">
               <a:rPr lang="ko-KR" altLang="en-US" smtClean="0"/>
-              <a:t>2023-10-10</a:t>
+              <a:t>2023-10-12</a:t>
             </a:fld>
             <a:endParaRPr lang="ko-KR" altLang="en-US"/>
           </a:p>
@@ -3689,10 +3689,10 @@
       </p:sp>
       <p:pic>
         <p:nvPicPr>
-          <p:cNvPr id="5" name="그림 4">
-            <a:extLst>
-              <a:ext uri="{FF2B5EF4-FFF2-40B4-BE49-F238E27FC236}">
-                <a16:creationId xmlns:a16="http://schemas.microsoft.com/office/drawing/2014/main" id="{65762381-7C6B-6BCB-D161-71CC9EB7272B}"/>
+          <p:cNvPr id="6" name="그림 5">
+            <a:extLst>
+              <a:ext uri="{FF2B5EF4-FFF2-40B4-BE49-F238E27FC236}">
+                <a16:creationId xmlns:a16="http://schemas.microsoft.com/office/drawing/2014/main" id="{B71005D9-04ED-76E9-D260-437CFB290560}"/>
               </a:ext>
             </a:extLst>
           </p:cNvPr>
@@ -3709,8 +3709,8 @@
         </p:blipFill>
         <p:spPr>
           <a:xfrm>
-            <a:off x="279918" y="1115977"/>
-            <a:ext cx="11708881" cy="5128773"/>
+            <a:off x="304799" y="1062449"/>
+            <a:ext cx="11582401" cy="5240324"/>
           </a:xfrm>
           <a:prstGeom prst="rect">
             <a:avLst/>

</xml_diff>